<commit_message>
rewrite (challenge, solution ,contributions), add caption to (list1, fig1), add superscript to authors, change content in (prune loop permu..., Merging..., ),
</commit_message>
<xml_diff>
--- a/sc19poster.pptx
+++ b/sc19poster.pptx
@@ -107,6 +107,11 @@
       </a:defRPr>
     </a:lvl9pPr>
   </p:defaultTextStyle>
+  <p:extLst>
+    <p:ext uri="{EFAFB233-063F-42B5-8137-9DF3F51BA10A}">
+      <p15:sldGuideLst xmlns:p15="http://schemas.microsoft.com/office/powerpoint/2012/main"/>
+    </p:ext>
+  </p:extLst>
 </p:presentation>
 </file>
 
@@ -2568,8 +2573,8 @@
         </p:blipFill>
         <p:spPr>
           <a:xfrm>
-            <a:off x="2011680" y="237600"/>
-            <a:ext cx="29077920" cy="2130840"/>
+            <a:off x="1998751" y="237600"/>
+            <a:ext cx="29090849" cy="2130840"/>
           </a:xfrm>
           <a:prstGeom prst="rect">
             <a:avLst/>
@@ -2845,8 +2850,8 @@
         </p:nvSpPr>
         <p:spPr>
           <a:xfrm>
-            <a:off x="763560" y="5505120"/>
-            <a:ext cx="10305720" cy="8444520"/>
+            <a:off x="274388" y="5136656"/>
+            <a:ext cx="10926490" cy="9289738"/>
           </a:xfrm>
           <a:prstGeom prst="rect">
             <a:avLst/>
@@ -2870,8 +2875,6 @@
                 <a:srgbClr val="000000"/>
               </a:buClr>
               <a:buSzPct val="45000"/>
-              <a:buFont typeface="Symbol" charset="2"/>
-              <a:buChar char=""/>
             </a:pPr>
             <a:r>
               <a:rPr lang="en-US" sz="3200" b="1" strike="noStrike" spc="-1" dirty="0">
@@ -2926,8 +2929,6 @@
                 <a:srgbClr val="000000"/>
               </a:buClr>
               <a:buSzPct val="45000"/>
-              <a:buFont typeface="Symbol" charset="2"/>
-              <a:buChar char=""/>
             </a:pPr>
             <a:r>
               <a:rPr lang="en-US" sz="3200" b="1" strike="noStrike" spc="-1" dirty="0">
@@ -2958,19 +2959,41 @@
               <a:buChar char=""/>
             </a:pPr>
             <a:r>
-              <a:rPr lang="en-US" sz="3200" b="0" strike="noStrike" spc="-1" dirty="0">
+              <a:rPr lang="en-US" sz="3200" spc="-1" dirty="0">
                 <a:solidFill>
                   <a:srgbClr val="000000"/>
                 </a:solidFill>
-                <a:latin typeface="Georgia"/>
-              </a:rPr>
-              <a:t>Exponential space of possible code versions when optimizing loop permutation and loop tiling</a:t>
+                <a:latin typeface="Georgia" panose="02040502050405020303" pitchFamily="18" charset="0"/>
+              </a:rPr>
+              <a:t>Exponential space of valid code configurations</a:t>
+            </a:r>
+          </a:p>
+          <a:p>
+            <a:pPr marL="182880">
+              <a:lnSpc>
+                <a:spcPct val="120000"/>
+              </a:lnSpc>
+              <a:buClr>
+                <a:srgbClr val="385D8A"/>
+              </a:buClr>
+              <a:buSzPct val="45000"/>
+              <a:buFont typeface="Wingdings" charset="2"/>
+              <a:buChar char=""/>
+            </a:pPr>
+            <a:r>
+              <a:rPr lang="en-US" sz="3200" spc="-1" dirty="0">
+                <a:solidFill>
+                  <a:srgbClr val="000000"/>
+                </a:solidFill>
+                <a:latin typeface="Georgia" panose="02040502050405020303" pitchFamily="18" charset="0"/>
+              </a:rPr>
+              <a:t>How to select the best performing code configuration?</a:t>
             </a:r>
             <a:endParaRPr lang="en-US" sz="3200" b="0" strike="noStrike" spc="-1" dirty="0">
               <a:solidFill>
                 <a:srgbClr val="000000"/>
               </a:solidFill>
-              <a:latin typeface="LM Roman 7"/>
+              <a:latin typeface="Georgia" panose="02040502050405020303" pitchFamily="18" charset="0"/>
             </a:endParaRPr>
           </a:p>
           <a:p>
@@ -2982,8 +3005,6 @@
                 <a:srgbClr val="385D8A"/>
               </a:buClr>
               <a:buSzPct val="45000"/>
-              <a:buFont typeface="Symbol" charset="2"/>
-              <a:buChar char=""/>
             </a:pPr>
             <a:r>
               <a:rPr lang="en-US" sz="3200" b="1" strike="noStrike" spc="-1" dirty="0">
@@ -2992,7 +3013,7 @@
                 </a:solidFill>
                 <a:latin typeface="Georgia"/>
               </a:rPr>
-              <a:t>Solution Approach</a:t>
+              <a:t>Solution</a:t>
             </a:r>
           </a:p>
           <a:p>
@@ -3014,7 +3035,7 @@
                 </a:solidFill>
                 <a:latin typeface="Georgia"/>
               </a:rPr>
-              <a:t>Algorithm to automatically compute data movement as a symbolic expression of tile-sizes</a:t>
+              <a:t>Data movement is the critical factor affects performance</a:t>
             </a:r>
           </a:p>
           <a:p>
@@ -3036,7 +3057,7 @@
                 </a:solidFill>
                 <a:latin typeface="Georgia"/>
               </a:rPr>
-              <a:t>Algorithm to automatically compute data movement as a symbolic expression of tile-sizes</a:t>
+              <a:t>Develop analytical models to estimate the data movement based on the code configuration</a:t>
             </a:r>
           </a:p>
           <a:p>
@@ -3058,7 +3079,7 @@
                 </a:solidFill>
                 <a:latin typeface="Georgia"/>
               </a:rPr>
-              <a:t>Estimation of execution time for multi-level memory hierarchy</a:t>
+              <a:t>Estimate the time of each code configuration and select the best performing version</a:t>
             </a:r>
           </a:p>
           <a:p>
@@ -3074,13 +3095,13 @@
               <a:buChar char=""/>
             </a:pPr>
             <a:r>
-              <a:rPr lang="en-US" sz="3200" spc="-1" dirty="0">
+              <a:rPr lang="en-US" sz="3200" b="1" spc="-1" dirty="0">
                 <a:solidFill>
-                  <a:srgbClr val="000000"/>
+                  <a:srgbClr val="385D8A"/>
                 </a:solidFill>
                 <a:latin typeface="Georgia"/>
               </a:rPr>
-              <a:t>Formulation of nonlinear optimization problem for automatic solution</a:t>
+              <a:t>Contributions</a:t>
             </a:r>
           </a:p>
           <a:p>
@@ -3095,12 +3116,37 @@
               <a:buFont typeface="Wingdings" charset="2"/>
               <a:buChar char=""/>
             </a:pPr>
-            <a:endParaRPr lang="en-US" sz="3200" spc="-1" dirty="0">
-              <a:solidFill>
+            <a:r>
+              <a:rPr lang="en-US" sz="3200" spc="-1" dirty="0">
+                <a:solidFill>
+                  <a:srgbClr val="000000"/>
+                </a:solidFill>
+                <a:latin typeface="Georgia"/>
+              </a:rPr>
+              <a:t>Modeling data movement of a multi-level memory hierarchy system as a non-linear optimization problem</a:t>
+            </a:r>
+          </a:p>
+          <a:p>
+            <a:pPr marL="182880">
+              <a:lnSpc>
+                <a:spcPct val="120000"/>
+              </a:lnSpc>
+              <a:buClr>
                 <a:srgbClr val="000000"/>
-              </a:solidFill>
-              <a:latin typeface="Georgia"/>
-            </a:endParaRPr>
+              </a:buClr>
+              <a:buSzPct val="45000"/>
+              <a:buFont typeface="Wingdings" charset="2"/>
+              <a:buChar char=""/>
+            </a:pPr>
+            <a:r>
+              <a:rPr lang="en-US" sz="3200" spc="-1" dirty="0">
+                <a:solidFill>
+                  <a:srgbClr val="000000"/>
+                </a:solidFill>
+                <a:latin typeface="Georgia"/>
+              </a:rPr>
+              <a:t>Estimating the execution time of tensor contractions on a multi-level memory system</a:t>
+            </a:r>
           </a:p>
         </p:txBody>
       </p:sp>
@@ -3144,12 +3190,10 @@
           </a:bodyPr>
           <a:lstStyle/>
           <a:p>
-            <a:pPr marL="182880">
+            <a:pPr marL="182880" algn="ctr">
               <a:buClr>
                 <a:srgbClr val="000000"/>
               </a:buClr>
-              <a:buFont typeface="Tahoma"/>
-              <a:buChar char="•"/>
             </a:pPr>
             <a:r>
               <a:rPr lang="en-US" sz="5400" b="0" strike="noStrike" spc="-1" dirty="0">
@@ -3158,7 +3202,25 @@
                 </a:solidFill>
                 <a:latin typeface="Georgia"/>
               </a:rPr>
-              <a:t>Rui Li,</a:t>
+              <a:t>Rui Li</a:t>
+            </a:r>
+            <a:r>
+              <a:rPr lang="en-US" sz="5400" spc="-1" baseline="30000" dirty="0">
+                <a:solidFill>
+                  <a:srgbClr val="000000"/>
+                </a:solidFill>
+                <a:latin typeface="Georgia"/>
+              </a:rPr>
+              <a:t>1</a:t>
+            </a:r>
+            <a:r>
+              <a:rPr lang="en-US" sz="5400" b="0" strike="noStrike" spc="-1" dirty="0">
+                <a:solidFill>
+                  <a:srgbClr val="000000"/>
+                </a:solidFill>
+                <a:latin typeface="Georgia"/>
+              </a:rPr>
+              <a:t>,</a:t>
             </a:r>
             <a:r>
               <a:rPr lang="en-US" sz="5400" b="0" strike="noStrike" spc="-1" baseline="14000000" dirty="0">
@@ -3176,16 +3238,16 @@
                 </a:solidFill>
                 <a:latin typeface="Georgia"/>
               </a:rPr>
-              <a:t>Aravind Sukumaran-</a:t>
-            </a:r>
-            <a:r>
-              <a:rPr lang="en-US" sz="5400" b="0" strike="noStrike" spc="-1" dirty="0" err="1">
+              <a:t>Aravind Sukumaran-Rajam</a:t>
+            </a:r>
+            <a:r>
+              <a:rPr lang="en-US" sz="5400" b="0" strike="noStrike" spc="-1" baseline="30000" dirty="0">
                 <a:solidFill>
                   <a:srgbClr val="000000"/>
                 </a:solidFill>
                 <a:latin typeface="Georgia"/>
               </a:rPr>
-              <a:t>Rajam</a:t>
+              <a:t>2</a:t>
             </a:r>
             <a:r>
               <a:rPr lang="en-US" sz="5400" spc="-1" dirty="0">
@@ -3223,7 +3285,25 @@
                 </a:solidFill>
                 <a:latin typeface="Georgia"/>
               </a:rPr>
-              <a:t>Richard </a:t>
+              <a:t>Richard Veras</a:t>
+            </a:r>
+            <a:r>
+              <a:rPr lang="en-US" sz="5400" b="0" strike="noStrike" spc="-1" baseline="30000" dirty="0">
+                <a:solidFill>
+                  <a:srgbClr val="000000"/>
+                </a:solidFill>
+                <a:latin typeface="Georgia"/>
+              </a:rPr>
+              <a:t>3</a:t>
+            </a:r>
+            <a:r>
+              <a:rPr lang="en-US" sz="5400" b="0" strike="noStrike" spc="-1" dirty="0">
+                <a:solidFill>
+                  <a:srgbClr val="000000"/>
+                </a:solidFill>
+                <a:latin typeface="Georgia"/>
+              </a:rPr>
+              <a:t>,  </a:t>
             </a:r>
             <a:r>
               <a:rPr lang="en-US" sz="5400" b="0" strike="noStrike" spc="-1" dirty="0" err="1">
@@ -3232,7 +3312,7 @@
                 </a:solidFill>
                 <a:latin typeface="Georgia"/>
               </a:rPr>
-              <a:t>Veras</a:t>
+              <a:t>Tze</a:t>
             </a:r>
             <a:r>
               <a:rPr lang="en-US" sz="5400" b="0" strike="noStrike" spc="-1" dirty="0">
@@ -3241,25 +3321,16 @@
                 </a:solidFill>
                 <a:latin typeface="Georgia"/>
               </a:rPr>
-              <a:t>,  </a:t>
-            </a:r>
-          </a:p>
-          <a:p>
-            <a:pPr marL="182880">
-              <a:buClr>
-                <a:srgbClr val="000000"/>
-              </a:buClr>
-              <a:buFont typeface="Tahoma"/>
-              <a:buChar char="•"/>
-            </a:pPr>
-            <a:r>
-              <a:rPr lang="en-US" sz="5400" b="0" strike="noStrike" spc="-1" dirty="0" err="1">
+              <a:t>-Meng Low</a:t>
+            </a:r>
+            <a:r>
+              <a:rPr lang="en-US" sz="5400" b="0" strike="noStrike" spc="-1" baseline="30000" dirty="0">
                 <a:solidFill>
                   <a:srgbClr val="000000"/>
                 </a:solidFill>
                 <a:latin typeface="Georgia"/>
               </a:rPr>
-              <a:t>Tze</a:t>
+              <a:t>4</a:t>
             </a:r>
             <a:r>
               <a:rPr lang="en-US" sz="5400" b="0" strike="noStrike" spc="-1" dirty="0">
@@ -3268,16 +3339,16 @@
                 </a:solidFill>
                 <a:latin typeface="Georgia"/>
               </a:rPr>
-              <a:t>-Meng Low, Fabrice </a:t>
-            </a:r>
-            <a:r>
-              <a:rPr lang="en-US" sz="5400" b="0" strike="noStrike" spc="-1" dirty="0" err="1">
+              <a:t>, Fabrice Rastello</a:t>
+            </a:r>
+            <a:r>
+              <a:rPr lang="en-US" sz="5400" b="0" strike="noStrike" spc="-1" baseline="30000" dirty="0">
                 <a:solidFill>
                   <a:srgbClr val="000000"/>
                 </a:solidFill>
                 <a:latin typeface="Georgia"/>
               </a:rPr>
-              <a:t>Rastello</a:t>
+              <a:t>5</a:t>
             </a:r>
             <a:r>
               <a:rPr lang="en-US" sz="5400" b="0" strike="noStrike" spc="-1" dirty="0">
@@ -3286,16 +3357,16 @@
                 </a:solidFill>
                 <a:latin typeface="Georgia"/>
               </a:rPr>
-              <a:t>, Atanas </a:t>
-            </a:r>
-            <a:r>
-              <a:rPr lang="en-US" sz="5400" b="0" strike="noStrike" spc="-1" dirty="0" err="1">
+              <a:t>, Atanas Rountev</a:t>
+            </a:r>
+            <a:r>
+              <a:rPr lang="en-US" sz="5400" b="0" strike="noStrike" spc="-1" baseline="30000" dirty="0">
                 <a:solidFill>
                   <a:srgbClr val="000000"/>
                 </a:solidFill>
                 <a:latin typeface="Georgia"/>
               </a:rPr>
-              <a:t>Rountev</a:t>
+              <a:t>6</a:t>
             </a:r>
             <a:r>
               <a:rPr lang="en-US" sz="5400" b="0" strike="noStrike" spc="-1" dirty="0">
@@ -3304,16 +3375,16 @@
                 </a:solidFill>
                 <a:latin typeface="Georgia"/>
               </a:rPr>
-              <a:t>, P. </a:t>
-            </a:r>
-            <a:r>
-              <a:rPr lang="en-US" sz="5400" b="0" strike="noStrike" spc="-1" dirty="0" err="1">
+              <a:t>, P. Sadayappan</a:t>
+            </a:r>
+            <a:r>
+              <a:rPr lang="en-US" sz="5400" b="0" strike="noStrike" spc="-1" baseline="30000" dirty="0">
                 <a:solidFill>
                   <a:srgbClr val="000000"/>
                 </a:solidFill>
                 <a:latin typeface="Georgia"/>
               </a:rPr>
-              <a:t>Sadayappan</a:t>
+              <a:t>1</a:t>
             </a:r>
             <a:r>
               <a:rPr lang="en-US" sz="5400" b="0" strike="noStrike" spc="-1" baseline="14000000" dirty="0">
@@ -3426,8 +3497,6 @@
                 <a:srgbClr val="000000"/>
               </a:buClr>
               <a:buSzPct val="45000"/>
-              <a:buFont typeface="Symbol" charset="2"/>
-              <a:buChar char=""/>
             </a:pPr>
             <a:r>
               <a:rPr lang="en-US" sz="3200" b="1" spc="-1" dirty="0">
@@ -3480,45 +3549,14 @@
               <a:buChar char=""/>
             </a:pPr>
             <a:r>
-              <a:rPr lang="en-US" sz="3200" b="0" strike="noStrike" spc="-1" dirty="0">
-                <a:solidFill>
-                  <a:srgbClr val="000000"/>
-                </a:solidFill>
-                <a:latin typeface="Georgia" panose="02040502050405020303" pitchFamily="18" charset="0"/>
-              </a:rPr>
-              <a:t>Prune loop permutations if they have </a:t>
-            </a:r>
-            <a:r>
               <a:rPr lang="en-US" sz="3200" spc="-1" dirty="0">
                 <a:solidFill>
                   <a:srgbClr val="000000"/>
                 </a:solidFill>
                 <a:latin typeface="Georgia" panose="02040502050405020303" pitchFamily="18" charset="0"/>
               </a:rPr>
-              <a:t>same </a:t>
-            </a:r>
-            <a:r>
-              <a:rPr lang="en-US" sz="3200" b="0" strike="noStrike" spc="-1" dirty="0">
-                <a:solidFill>
-                  <a:srgbClr val="000000"/>
-                </a:solidFill>
-                <a:latin typeface="Georgia" panose="02040502050405020303" pitchFamily="18" charset="0"/>
-              </a:rPr>
-              <a:t>data movement expression</a:t>
-            </a:r>
-          </a:p>
-          <a:p>
-            <a:pPr marL="182880">
-              <a:lnSpc>
-                <a:spcPct val="120000"/>
-              </a:lnSpc>
-              <a:buClr>
-                <a:srgbClr val="000000"/>
-              </a:buClr>
-              <a:buSzPct val="45000"/>
-              <a:buFont typeface="Wingdings" charset="2"/>
-              <a:buChar char=""/>
-            </a:pPr>
+              <a:t>Prune loop permutations with same data movement expression</a:t>
+            </a:r>
             <a:endParaRPr lang="en-US" sz="3200" b="0" strike="noStrike" spc="-1" dirty="0">
               <a:solidFill>
                 <a:srgbClr val="000000"/>
@@ -3563,8 +3601,6 @@
                     <a:srgbClr val="000000"/>
                   </a:buClr>
                   <a:buSzPct val="45000"/>
-                  <a:buFont typeface="Symbol" charset="2"/>
-                  <a:buChar char=""/>
                 </a:pPr>
                 <a:r>
                   <a:rPr lang="en-US" sz="3200" b="1" strike="noStrike" spc="-1" dirty="0">
@@ -3573,7 +3609,43 @@
                     </a:solidFill>
                     <a:latin typeface="Georgia"/>
                   </a:rPr>
-                  <a:t>Problem formalization for single level cache</a:t>
+                  <a:t>Problem Formalization for Single </a:t>
+                </a:r>
+                <a:r>
+                  <a:rPr lang="en-US" sz="3200" b="1" spc="-1" dirty="0">
+                    <a:solidFill>
+                      <a:srgbClr val="385D8A"/>
+                    </a:solidFill>
+                    <a:latin typeface="Georgia"/>
+                  </a:rPr>
+                  <a:t>L</a:t>
+                </a:r>
+                <a:r>
+                  <a:rPr lang="en-US" sz="3200" b="1" strike="noStrike" spc="-1" dirty="0">
+                    <a:solidFill>
+                      <a:srgbClr val="385D8A"/>
+                    </a:solidFill>
+                    <a:latin typeface="Georgia"/>
+                  </a:rPr>
+                  <a:t>evel </a:t>
+                </a:r>
+                <a:r>
+                  <a:rPr lang="en-US" sz="3200" b="1" spc="-1" dirty="0">
+                    <a:solidFill>
+                      <a:srgbClr val="385D8A"/>
+                    </a:solidFill>
+                    <a:latin typeface="Georgia"/>
+                  </a:rPr>
+                  <a:t>C</a:t>
+                </a:r>
+                <a:r>
+                  <a:rPr lang="en-US" sz="3200" b="1" strike="noStrike" spc="-1" dirty="0">
+                    <a:solidFill>
+                      <a:srgbClr val="385D8A"/>
+                    </a:solidFill>
+                    <a:latin typeface="Georgia"/>
+                  </a:rPr>
+                  <a:t>ache</a:t>
                 </a:r>
                 <a:endParaRPr lang="en-US" sz="3200" b="0" strike="noStrike" spc="-1" dirty="0">
                   <a:solidFill>
@@ -5131,7 +5203,7 @@
               <a:blipFill>
                 <a:blip r:embed="rId4"/>
                 <a:stretch>
-                  <a:fillRect t="-725"/>
+                  <a:fillRect t="-725" r="-759"/>
                 </a:stretch>
               </a:blipFill>
               <a:ln>
@@ -5164,7 +5236,7 @@
             <p:spPr>
               <a:xfrm>
                 <a:off x="11066760" y="16350826"/>
-                <a:ext cx="10420664" cy="5284524"/>
+                <a:ext cx="10509169" cy="5284524"/>
               </a:xfrm>
               <a:prstGeom prst="rect">
                 <a:avLst/>
@@ -5188,8 +5260,6 @@
                     <a:srgbClr val="000000"/>
                   </a:buClr>
                   <a:buSzPct val="45000"/>
-                  <a:buFont typeface="Symbol" charset="2"/>
-                  <a:buChar char=""/>
                 </a:pPr>
                 <a:r>
                   <a:rPr lang="en-US" sz="3200" b="1" strike="noStrike" spc="-1" dirty="0">
@@ -5198,7 +5268,7 @@
                     </a:solidFill>
                     <a:latin typeface="Georgia"/>
                   </a:rPr>
-                  <a:t>Edge Cases Handling: Tile Size equal to Range</a:t>
+                  <a:t>Edge Cases Handling: Tile Size Equal to Range</a:t>
                 </a:r>
                 <a:endParaRPr lang="en-US" sz="3200" b="0" strike="noStrike" spc="-1" dirty="0">
                   <a:solidFill>
@@ -5282,7 +5352,7 @@
                     </a:solidFill>
                     <a:latin typeface="Georgia"/>
                   </a:rPr>
-                  <a:t>can fit in cache, setting    </a:t>
+                  <a:t>can fit in cache, setting     </a:t>
                 </a:r>
                 <a14:m>
                   <m:oMath xmlns:m="http://schemas.openxmlformats.org/officeDocument/2006/math">
@@ -5493,7 +5563,7 @@
                     </a:solidFill>
                     <a:latin typeface="Georgia" panose="02040502050405020303" pitchFamily="18" charset="0"/>
                   </a:rPr>
-                  <a:t>Tree shows all cases for a fixed permutation of </a:t>
+                  <a:t>Fig.1  shows all cases for a fixed permutation of </a:t>
                 </a:r>
                 <a:r>
                   <a:rPr lang="en-US" sz="3200" spc="-1" dirty="0" err="1">
@@ -5608,7 +5678,7 @@
             <p:spPr>
               <a:xfrm>
                 <a:off x="11066760" y="16350826"/>
-                <a:ext cx="10420664" cy="5284524"/>
+                <a:ext cx="10509169" cy="5284524"/>
               </a:xfrm>
               <a:prstGeom prst="rect">
                 <a:avLst/>
@@ -5616,7 +5686,7 @@
               <a:blipFill>
                 <a:blip r:embed="rId5"/>
                 <a:stretch>
-                  <a:fillRect t="-239" r="-365"/>
+                  <a:fillRect t="-239" r="-1448"/>
                 </a:stretch>
               </a:blipFill>
               <a:ln>
@@ -5638,8 +5708,8 @@
           </p:sp>
         </mc:Fallback>
       </mc:AlternateContent>
-      <mc:AlternateContent xmlns:mc="http://schemas.openxmlformats.org/markup-compatibility/2006">
-        <mc:Choice xmlns:a14="http://schemas.microsoft.com/office/drawing/2010/main" Requires="a14">
+      <mc:AlternateContent xmlns:mc="http://schemas.openxmlformats.org/markup-compatibility/2006" xmlns:a14="http://schemas.microsoft.com/office/drawing/2010/main">
+        <mc:Choice Requires="a14">
           <p:sp>
             <p:nvSpPr>
               <p:cNvPr id="64" name="TextShape 16"/>
@@ -6058,7 +6128,7 @@
             </p:txBody>
           </p:sp>
         </mc:Choice>
-        <mc:Fallback>
+        <mc:Fallback xmlns="">
           <p:sp>
             <p:nvSpPr>
               <p:cNvPr id="64" name="TextShape 16"/>
@@ -6450,8 +6520,6 @@
               <a:buClr>
                 <a:srgbClr val="000000"/>
               </a:buClr>
-              <a:buFont typeface="Tahoma"/>
-              <a:buChar char="•"/>
             </a:pPr>
             <a:r>
               <a:rPr lang="en-US" sz="5400" b="0" strike="noStrike" spc="-1" dirty="0">
@@ -6460,17 +6528,16 @@
                 </a:solidFill>
                 <a:latin typeface="Georgia"/>
               </a:rPr>
-              <a:t>     </a:t>
-            </a:r>
-            <a:r>
-              <a:rPr lang="en-US" sz="5400" b="0" strike="noStrike" spc="-1" baseline="14000000" dirty="0">
+              <a:t>Utah</a:t>
+            </a:r>
+            <a:r>
+              <a:rPr lang="en-US" sz="5400" b="0" strike="noStrike" spc="-1" baseline="30000" dirty="0">
                 <a:solidFill>
                   <a:srgbClr val="000000"/>
                 </a:solidFill>
-                <a:latin typeface="Droid Sans"/>
-                <a:ea typeface="Droid Sans"/>
-              </a:rPr>
-              <a:t>†</a:t>
+                <a:latin typeface="Georgia"/>
+              </a:rPr>
+              <a:t>1</a:t>
             </a:r>
             <a:r>
               <a:rPr lang="en-US" sz="5400" b="0" strike="noStrike" spc="-1" dirty="0">
@@ -6479,17 +6546,44 @@
                 </a:solidFill>
                 <a:latin typeface="Georgia"/>
               </a:rPr>
-              <a:t>Utah, WSU, LSU,</a:t>
-            </a:r>
-          </a:p>
-          <a:p>
-            <a:pPr marL="182880">
-              <a:buClr>
-                <a:srgbClr val="000000"/>
-              </a:buClr>
-              <a:buFont typeface="Tahoma"/>
-              <a:buChar char="•"/>
-            </a:pPr>
+              <a:t>, WSU</a:t>
+            </a:r>
+            <a:r>
+              <a:rPr lang="en-US" sz="5400" b="0" strike="noStrike" spc="-1" baseline="30000" dirty="0">
+                <a:solidFill>
+                  <a:srgbClr val="000000"/>
+                </a:solidFill>
+                <a:latin typeface="Georgia"/>
+              </a:rPr>
+              <a:t>2</a:t>
+            </a:r>
+            <a:r>
+              <a:rPr lang="en-US" sz="5400" b="0" strike="noStrike" spc="-1" dirty="0">
+                <a:solidFill>
+                  <a:srgbClr val="000000"/>
+                </a:solidFill>
+                <a:latin typeface="Georgia"/>
+              </a:rPr>
+              <a:t>, LSU</a:t>
+            </a:r>
+            <a:r>
+              <a:rPr lang="en-US" sz="5400" b="0" strike="noStrike" spc="-1" baseline="30000" dirty="0">
+                <a:solidFill>
+                  <a:srgbClr val="000000"/>
+                </a:solidFill>
+                <a:latin typeface="Georgia"/>
+              </a:rPr>
+              <a:t>3</a:t>
+            </a:r>
+            <a:r>
+              <a:rPr lang="en-US" sz="5400" b="0" strike="noStrike" spc="-1" dirty="0">
+                <a:solidFill>
+                  <a:srgbClr val="000000"/>
+                </a:solidFill>
+                <a:latin typeface="Georgia"/>
+              </a:rPr>
+              <a:t>,</a:t>
+            </a:r>
             <a:r>
               <a:rPr lang="en-US" sz="5400" spc="-1" dirty="0">
                 <a:solidFill>
@@ -6497,7 +6591,52 @@
                 </a:solidFill>
                 <a:latin typeface="Georgia"/>
               </a:rPr>
-              <a:t>  	    CMU, INRIA, OSU</a:t>
+              <a:t> CMU</a:t>
+            </a:r>
+            <a:r>
+              <a:rPr lang="en-US" sz="5400" spc="-1" baseline="30000" dirty="0">
+                <a:solidFill>
+                  <a:srgbClr val="000000"/>
+                </a:solidFill>
+                <a:latin typeface="Georgia"/>
+              </a:rPr>
+              <a:t>4</a:t>
+            </a:r>
+            <a:r>
+              <a:rPr lang="en-US" sz="5400" spc="-1" dirty="0">
+                <a:solidFill>
+                  <a:srgbClr val="000000"/>
+                </a:solidFill>
+                <a:latin typeface="Georgia"/>
+              </a:rPr>
+              <a:t>, INRIA</a:t>
+            </a:r>
+            <a:r>
+              <a:rPr lang="en-US" sz="5400" spc="-1" baseline="30000" dirty="0">
+                <a:solidFill>
+                  <a:srgbClr val="000000"/>
+                </a:solidFill>
+                <a:latin typeface="Georgia"/>
+              </a:rPr>
+              <a:t>5</a:t>
+            </a:r>
+            <a:r>
+              <a:rPr lang="en-US" sz="5400" spc="-1" dirty="0">
+                <a:solidFill>
+                  <a:srgbClr val="000000"/>
+                </a:solidFill>
+                <a:latin typeface="Georgia"/>
+              </a:rPr>
+              <a:t>, OSU</a:t>
+            </a:r>
+            <a:r>
+              <a:rPr lang="en-US" sz="5400" spc="-1" baseline="30000" dirty="0">
+                <a:solidFill>
+                  <a:srgbClr val="000000"/>
+                </a:solidFill>
+                <a:latin typeface="Georgia"/>
+              </a:rPr>
+              <a:t>6</a:t>
             </a:r>
             <a:endParaRPr lang="en-US" sz="5400" b="0" strike="noStrike" spc="-1" dirty="0">
               <a:solidFill>
@@ -6530,7 +6669,7 @@
         </p:nvSpPr>
         <p:spPr>
           <a:xfrm>
-            <a:off x="970907" y="14048868"/>
+            <a:off x="970907" y="14653540"/>
             <a:ext cx="9169946" cy="2185214"/>
           </a:xfrm>
           <a:prstGeom prst="rect">
@@ -6583,7 +6722,7 @@
         </p:nvSpPr>
         <p:spPr>
           <a:xfrm>
-            <a:off x="5603760" y="16234082"/>
+            <a:off x="6380870" y="16487947"/>
             <a:ext cx="5604840" cy="5204348"/>
           </a:xfrm>
           <a:prstGeom prst="rect">
@@ -6592,7 +6731,7 @@
         </p:spPr>
         <p:txBody>
           <a:bodyPr vert="horz" lIns="91440" tIns="91440" rIns="91440" bIns="45720" rtlCol="0" anchor="t">
-            <a:normAutofit lnSpcReduction="10000"/>
+            <a:normAutofit/>
           </a:bodyPr>
           <a:lstStyle>
             <a:lvl1pPr marL="182880" indent="-182880" algn="l" defTabSz="914400" rtl="0" eaLnBrk="1" latinLnBrk="0" hangingPunct="1">
@@ -6841,17 +6980,20 @@
               <a:lnSpc>
                 <a:spcPct val="60000"/>
               </a:lnSpc>
+              <a:spcBef>
+                <a:spcPts val="600"/>
+              </a:spcBef>
               <a:buNone/>
             </a:pPr>
             <a:r>
-              <a:rPr lang="da-DK" sz="2400" dirty="0">
+              <a:rPr lang="da-DK" dirty="0">
                 <a:solidFill>
                   <a:srgbClr val="C00000"/>
                 </a:solidFill>
                 <a:latin typeface="Courier"/>
                 <a:cs typeface="Courier"/>
               </a:rPr>
-              <a:t>for (ti=0:Ni:Ti)</a:t>
+              <a:t>for(ti=0:Ni:Ti)</a:t>
             </a:r>
           </a:p>
           <a:p>
@@ -6859,17 +7001,20 @@
               <a:lnSpc>
                 <a:spcPct val="60000"/>
               </a:lnSpc>
+              <a:spcBef>
+                <a:spcPts val="600"/>
+              </a:spcBef>
               <a:buNone/>
             </a:pPr>
             <a:r>
-              <a:rPr lang="da-DK" sz="2400" dirty="0">
+              <a:rPr lang="da-DK" dirty="0">
                 <a:solidFill>
                   <a:srgbClr val="C00000"/>
                 </a:solidFill>
                 <a:latin typeface="Courier"/>
                 <a:cs typeface="Courier"/>
               </a:rPr>
-              <a:t> for (tj=0:Ni:Tj)</a:t>
+              <a:t> for(tj=0:Ni:Tj)</a:t>
             </a:r>
           </a:p>
           <a:p>
@@ -6877,17 +7022,20 @@
               <a:lnSpc>
                 <a:spcPct val="60000"/>
               </a:lnSpc>
+              <a:spcBef>
+                <a:spcPts val="600"/>
+              </a:spcBef>
               <a:buNone/>
             </a:pPr>
             <a:r>
-              <a:rPr lang="da-DK" sz="2400" dirty="0">
+              <a:rPr lang="da-DK" dirty="0">
                 <a:solidFill>
                   <a:srgbClr val="C00000"/>
                 </a:solidFill>
                 <a:latin typeface="Courier"/>
                 <a:cs typeface="Courier"/>
               </a:rPr>
-              <a:t>  for (tk=0:Nk:Tk)</a:t>
+              <a:t>  for(tk=0:Nk:Tk)</a:t>
             </a:r>
           </a:p>
           <a:p>
@@ -6895,20 +7043,23 @@
               <a:lnSpc>
                 <a:spcPct val="60000"/>
               </a:lnSpc>
+              <a:spcBef>
+                <a:spcPts val="600"/>
+              </a:spcBef>
               <a:buNone/>
             </a:pPr>
             <a:r>
-              <a:rPr lang="da-DK" sz="2400" dirty="0">
+              <a:rPr lang="da-DK" dirty="0">
                 <a:solidFill>
                   <a:srgbClr val="C00000"/>
                 </a:solidFill>
                 <a:latin typeface="Courier"/>
                 <a:cs typeface="Courier"/>
               </a:rPr>
-              <a:t>   for (</a:t>
-            </a:r>
-            <a:r>
-              <a:rPr lang="da-DK" sz="2400" dirty="0" err="1">
+              <a:t>   for(</a:t>
+            </a:r>
+            <a:r>
+              <a:rPr lang="da-DK" dirty="0" err="1">
                 <a:solidFill>
                   <a:srgbClr val="C00000"/>
                 </a:solidFill>
@@ -6918,7 +7069,7 @@
               <a:t>tl</a:t>
             </a:r>
             <a:r>
-              <a:rPr lang="da-DK" sz="2400" dirty="0">
+              <a:rPr lang="da-DK" dirty="0">
                 <a:solidFill>
                   <a:srgbClr val="C00000"/>
                 </a:solidFill>
@@ -6933,20 +7084,23 @@
               <a:lnSpc>
                 <a:spcPct val="60000"/>
               </a:lnSpc>
+              <a:spcBef>
+                <a:spcPts val="600"/>
+              </a:spcBef>
               <a:buNone/>
             </a:pPr>
             <a:r>
-              <a:rPr lang="da-DK" sz="2400" dirty="0">
+              <a:rPr lang="da-DK" dirty="0">
                 <a:solidFill>
                   <a:srgbClr val="C00000"/>
                 </a:solidFill>
                 <a:latin typeface="Courier"/>
                 <a:cs typeface="Courier"/>
               </a:rPr>
-              <a:t>    for (</a:t>
-            </a:r>
-            <a:r>
-              <a:rPr lang="da-DK" sz="2400" dirty="0" err="1">
+              <a:t>    for(</a:t>
+            </a:r>
+            <a:r>
+              <a:rPr lang="da-DK" dirty="0" err="1">
                 <a:solidFill>
                   <a:srgbClr val="C00000"/>
                 </a:solidFill>
@@ -6956,7 +7110,7 @@
               <a:t>tm</a:t>
             </a:r>
             <a:r>
-              <a:rPr lang="da-DK" sz="2400" dirty="0">
+              <a:rPr lang="da-DK" dirty="0">
                 <a:solidFill>
                   <a:srgbClr val="C00000"/>
                 </a:solidFill>
@@ -6971,17 +7125,20 @@
               <a:lnSpc>
                 <a:spcPct val="60000"/>
               </a:lnSpc>
+              <a:spcBef>
+                <a:spcPts val="600"/>
+              </a:spcBef>
               <a:buNone/>
             </a:pPr>
             <a:r>
-              <a:rPr lang="da-DK" sz="2400" dirty="0">
+              <a:rPr lang="da-DK" dirty="0">
                 <a:solidFill>
                   <a:srgbClr val="C00000"/>
                 </a:solidFill>
                 <a:latin typeface="Courier"/>
                 <a:cs typeface="Courier"/>
               </a:rPr>
-              <a:t>     for (tn=0:Nn:Tn)</a:t>
+              <a:t>     for(tn=0:Nn:Tn)</a:t>
             </a:r>
           </a:p>
           <a:p>
@@ -6989,17 +7146,20 @@
               <a:lnSpc>
                 <a:spcPct val="60000"/>
               </a:lnSpc>
+              <a:spcBef>
+                <a:spcPts val="600"/>
+              </a:spcBef>
               <a:buNone/>
             </a:pPr>
             <a:r>
-              <a:rPr lang="da-DK" sz="2400" dirty="0">
+              <a:rPr lang="da-DK" dirty="0">
                 <a:latin typeface="Courier"/>
                 <a:cs typeface="Courier"/>
               </a:rPr>
               <a:t>	</a:t>
             </a:r>
             <a:r>
-              <a:rPr lang="da-DK" sz="2400" dirty="0">
+              <a:rPr lang="da-DK" dirty="0">
                 <a:solidFill>
                   <a:srgbClr val="C00000"/>
                 </a:solidFill>
@@ -7009,14 +7169,14 @@
               <a:t> </a:t>
             </a:r>
             <a:r>
-              <a:rPr lang="da-DK" sz="2400" dirty="0">
+              <a:rPr lang="da-DK" dirty="0">
                 <a:solidFill>
                   <a:srgbClr val="0070C0"/>
                 </a:solidFill>
                 <a:latin typeface="Courier"/>
                 <a:cs typeface="Courier"/>
               </a:rPr>
-              <a:t>for (i=ti:ti+Ti:1)</a:t>
+              <a:t>for(i=ti:ti+Ti:1)</a:t>
             </a:r>
           </a:p>
           <a:p>
@@ -7024,10 +7184,13 @@
               <a:lnSpc>
                 <a:spcPct val="60000"/>
               </a:lnSpc>
+              <a:spcBef>
+                <a:spcPts val="600"/>
+              </a:spcBef>
               <a:buNone/>
             </a:pPr>
             <a:r>
-              <a:rPr lang="da-DK" sz="2400" dirty="0">
+              <a:rPr lang="da-DK" dirty="0">
                 <a:solidFill>
                   <a:schemeClr val="accent1">
                     <a:lumMod val="75000"/>
@@ -7039,14 +7202,14 @@
               <a:t> 	  </a:t>
             </a:r>
             <a:r>
-              <a:rPr lang="da-DK" sz="2400" dirty="0">
+              <a:rPr lang="da-DK" dirty="0">
                 <a:solidFill>
                   <a:srgbClr val="0070C0"/>
                 </a:solidFill>
                 <a:latin typeface="Courier"/>
                 <a:cs typeface="Courier"/>
               </a:rPr>
-              <a:t>for (j=tj:tj+Tj:1)</a:t>
+              <a:t>for(j=tj:tj+Tj:1)</a:t>
             </a:r>
           </a:p>
           <a:p>
@@ -7054,17 +7217,20 @@
               <a:lnSpc>
                 <a:spcPct val="60000"/>
               </a:lnSpc>
+              <a:spcBef>
+                <a:spcPts val="600"/>
+              </a:spcBef>
               <a:buNone/>
             </a:pPr>
             <a:r>
-              <a:rPr lang="da-DK" sz="2400" dirty="0">
+              <a:rPr lang="da-DK" dirty="0">
                 <a:solidFill>
                   <a:srgbClr val="0070C0"/>
                 </a:solidFill>
                 <a:latin typeface="Courier"/>
                 <a:cs typeface="Courier"/>
               </a:rPr>
-              <a:t>  	   for (k=tk:tk+Tk:1)</a:t>
+              <a:t>  	   for(k=tk:tk+Tk:1)</a:t>
             </a:r>
           </a:p>
           <a:p>
@@ -7072,17 +7238,20 @@
               <a:lnSpc>
                 <a:spcPct val="60000"/>
               </a:lnSpc>
+              <a:spcBef>
+                <a:spcPts val="600"/>
+              </a:spcBef>
               <a:buNone/>
             </a:pPr>
             <a:r>
-              <a:rPr lang="da-DK" sz="2400" dirty="0">
+              <a:rPr lang="da-DK" dirty="0">
                 <a:solidFill>
                   <a:srgbClr val="0070C0"/>
                 </a:solidFill>
                 <a:latin typeface="Courier"/>
                 <a:cs typeface="Courier"/>
               </a:rPr>
-              <a:t>   	    for (l=tl:tl+Tl:1)</a:t>
+              <a:t>   	    for(l=tl:tl+Tl:1)</a:t>
             </a:r>
           </a:p>
           <a:p>
@@ -7090,17 +7259,20 @@
               <a:lnSpc>
                 <a:spcPct val="60000"/>
               </a:lnSpc>
+              <a:spcBef>
+                <a:spcPts val="600"/>
+              </a:spcBef>
               <a:buNone/>
             </a:pPr>
             <a:r>
-              <a:rPr lang="da-DK" sz="2400" dirty="0">
+              <a:rPr lang="da-DK" dirty="0">
                 <a:solidFill>
                   <a:srgbClr val="0070C0"/>
                 </a:solidFill>
                 <a:latin typeface="Courier"/>
                 <a:cs typeface="Courier"/>
               </a:rPr>
-              <a:t>    		for (m=tm:tm+Tm:1)</a:t>
+              <a:t>    		for(m=tm:tm+Tm:1)</a:t>
             </a:r>
           </a:p>
           <a:p>
@@ -7108,17 +7280,20 @@
               <a:lnSpc>
                 <a:spcPct val="60000"/>
               </a:lnSpc>
+              <a:spcBef>
+                <a:spcPts val="600"/>
+              </a:spcBef>
               <a:buNone/>
             </a:pPr>
             <a:r>
-              <a:rPr lang="da-DK" sz="2400" dirty="0">
+              <a:rPr lang="da-DK" dirty="0">
                 <a:solidFill>
                   <a:srgbClr val="0070C0"/>
                 </a:solidFill>
                 <a:latin typeface="Courier"/>
                 <a:cs typeface="Courier"/>
               </a:rPr>
-              <a:t>     		 for (n=tn:tn+tn:1)</a:t>
+              <a:t>     		 for(n=tn:tn+tn:1)</a:t>
             </a:r>
           </a:p>
           <a:p>
@@ -7126,35 +7301,38 @@
               <a:lnSpc>
                 <a:spcPct val="60000"/>
               </a:lnSpc>
+              <a:spcBef>
+                <a:spcPts val="600"/>
+              </a:spcBef>
               <a:buNone/>
             </a:pPr>
             <a:r>
-              <a:rPr lang="da-DK" sz="2400" dirty="0">
+              <a:rPr lang="da-DK" dirty="0">
                 <a:latin typeface="Courier"/>
                 <a:cs typeface="Courier"/>
               </a:rPr>
               <a:t>     </a:t>
             </a:r>
             <a:r>
-              <a:rPr lang="zh-CN" altLang="en-US" sz="2400" dirty="0">
+              <a:rPr lang="zh-CN" altLang="en-US" dirty="0">
                 <a:latin typeface="Courier"/>
                 <a:cs typeface="Courier"/>
               </a:rPr>
               <a:t> </a:t>
             </a:r>
             <a:r>
-              <a:rPr lang="en-US" altLang="zh-CN" sz="2400" dirty="0">
+              <a:rPr lang="en-US" altLang="zh-CN" dirty="0">
                 <a:latin typeface="Courier"/>
                 <a:cs typeface="Courier"/>
               </a:rPr>
-              <a:t>      </a:t>
-            </a:r>
-            <a:r>
-              <a:rPr lang="da-DK" sz="2400" dirty="0">
+              <a:t>        </a:t>
+            </a:r>
+            <a:r>
+              <a:rPr lang="da-DK" dirty="0">
                 <a:latin typeface="Courier"/>
                 <a:cs typeface="Courier"/>
               </a:rPr>
-              <a:t>C[i][j][k][l]+= 						        A[i][m][k][n]*</a:t>
+              <a:t>C[i][j][k][l]+= 							   A[i][m][k][n]*</a:t>
             </a:r>
           </a:p>
           <a:p>
@@ -7162,16 +7340,19 @@
               <a:lnSpc>
                 <a:spcPct val="60000"/>
               </a:lnSpc>
+              <a:spcBef>
+                <a:spcPts val="600"/>
+              </a:spcBef>
               <a:buNone/>
             </a:pPr>
             <a:r>
-              <a:rPr lang="da-DK" sz="2400" dirty="0">
+              <a:rPr lang="da-DK" dirty="0">
                 <a:latin typeface="Courier"/>
                 <a:cs typeface="Courier"/>
               </a:rPr>
               <a:t>		   B[j][n][l][m];</a:t>
             </a:r>
-            <a:endParaRPr lang="en-US" sz="2400" dirty="0">
+            <a:endParaRPr lang="en-US" dirty="0">
               <a:latin typeface="Courier"/>
               <a:cs typeface="Courier"/>
             </a:endParaRPr>
@@ -7192,8 +7373,8 @@
         </p:nvSpPr>
         <p:spPr>
           <a:xfrm>
-            <a:off x="767883" y="15807460"/>
-            <a:ext cx="5066097" cy="5834754"/>
+            <a:off x="318240" y="16358635"/>
+            <a:ext cx="6110171" cy="5834754"/>
           </a:xfrm>
           <a:prstGeom prst="rect">
             <a:avLst/>
@@ -7217,8 +7398,6 @@
                 <a:srgbClr val="000000"/>
               </a:buClr>
               <a:buSzPct val="45000"/>
-              <a:buFont typeface="Symbol" charset="2"/>
-              <a:buChar char=""/>
             </a:pPr>
             <a:r>
               <a:rPr lang="en-US" sz="3200" b="1" strike="noStrike" spc="-1" dirty="0">
@@ -7243,35 +7422,22 @@
               <a:buChar char=""/>
             </a:pPr>
             <a:r>
+              <a:rPr lang="en-US" sz="3200" spc="-1" dirty="0">
+                <a:solidFill>
+                  <a:srgbClr val="000000"/>
+                </a:solidFill>
+                <a:latin typeface="Georgia" panose="02040502050405020303" pitchFamily="18" charset="0"/>
+              </a:rPr>
+              <a:t>6</a:t>
+            </a:r>
+            <a:r>
               <a:rPr lang="en-US" sz="3200" b="0" strike="noStrike" spc="-1" dirty="0">
                 <a:solidFill>
                   <a:srgbClr val="000000"/>
                 </a:solidFill>
                 <a:latin typeface="Georgia" panose="02040502050405020303" pitchFamily="18" charset="0"/>
               </a:rPr>
-              <a:t>Tiling example for single level cache</a:t>
-            </a:r>
-          </a:p>
-          <a:p>
-            <a:pPr marL="182880">
-              <a:lnSpc>
-                <a:spcPct val="120000"/>
-              </a:lnSpc>
-              <a:buClr>
-                <a:srgbClr val="000000"/>
-              </a:buClr>
-              <a:buSzPct val="45000"/>
-              <a:buFont typeface="Symbol" charset="2"/>
-              <a:buChar char=""/>
-            </a:pPr>
-            <a:r>
-              <a:rPr lang="en-US" sz="3200" b="0" strike="noStrike" spc="-1" dirty="0">
-                <a:solidFill>
-                  <a:srgbClr val="000000"/>
-                </a:solidFill>
-                <a:latin typeface="Georgia" panose="02040502050405020303" pitchFamily="18" charset="0"/>
-              </a:rPr>
-              <a:t>6! Permutations brought by </a:t>
+              <a:t>! Permutations brought by                </a:t>
             </a:r>
             <a:r>
               <a:rPr lang="en-US" sz="3200" b="0" strike="noStrike" spc="-1" dirty="0">
@@ -8064,8 +8230,8 @@
           </a:p>
         </p:txBody>
       </p:sp>
-      <mc:AlternateContent xmlns:mc="http://schemas.openxmlformats.org/markup-compatibility/2006">
-        <mc:Choice xmlns:a14="http://schemas.microsoft.com/office/drawing/2010/main" Requires="a14">
+      <mc:AlternateContent xmlns:mc="http://schemas.openxmlformats.org/markup-compatibility/2006" xmlns:a14="http://schemas.microsoft.com/office/drawing/2010/main">
+        <mc:Choice Requires="a14">
           <p:sp>
             <p:nvSpPr>
               <p:cNvPr id="82" name="TextBox 81">
@@ -8583,7 +8749,7 @@
             </p:txBody>
           </p:sp>
         </mc:Choice>
-        <mc:Fallback>
+        <mc:Fallback xmlns="">
           <p:sp>
             <p:nvSpPr>
               <p:cNvPr id="82" name="TextBox 81">
@@ -8628,8 +8794,8 @@
           </p:sp>
         </mc:Fallback>
       </mc:AlternateContent>
-      <mc:AlternateContent xmlns:mc="http://schemas.openxmlformats.org/markup-compatibility/2006">
-        <mc:Choice xmlns:a14="http://schemas.microsoft.com/office/drawing/2010/main" Requires="a14">
+      <mc:AlternateContent xmlns:mc="http://schemas.openxmlformats.org/markup-compatibility/2006" xmlns:a14="http://schemas.microsoft.com/office/drawing/2010/main">
+        <mc:Choice Requires="a14">
           <p:sp>
             <p:nvSpPr>
               <p:cNvPr id="83" name="TextBox 82">
@@ -9130,7 +9296,7 @@
             </p:txBody>
           </p:sp>
         </mc:Choice>
-        <mc:Fallback>
+        <mc:Fallback xmlns="">
           <p:sp>
             <p:nvSpPr>
               <p:cNvPr id="83" name="TextBox 82">
@@ -9175,8 +9341,8 @@
           </p:sp>
         </mc:Fallback>
       </mc:AlternateContent>
-      <mc:AlternateContent xmlns:mc="http://schemas.openxmlformats.org/markup-compatibility/2006">
-        <mc:Choice xmlns:a14="http://schemas.microsoft.com/office/drawing/2010/main" Requires="a14">
+      <mc:AlternateContent xmlns:mc="http://schemas.openxmlformats.org/markup-compatibility/2006" xmlns:a14="http://schemas.microsoft.com/office/drawing/2010/main">
+        <mc:Choice Requires="a14">
           <p:sp>
             <p:nvSpPr>
               <p:cNvPr id="84" name="TextBox 83">
@@ -9677,7 +9843,7 @@
             </p:txBody>
           </p:sp>
         </mc:Choice>
-        <mc:Fallback>
+        <mc:Fallback xmlns="">
           <p:sp>
             <p:nvSpPr>
               <p:cNvPr id="84" name="TextBox 83">
@@ -9722,8 +9888,8 @@
           </p:sp>
         </mc:Fallback>
       </mc:AlternateContent>
-      <mc:AlternateContent xmlns:mc="http://schemas.openxmlformats.org/markup-compatibility/2006">
-        <mc:Choice xmlns:a14="http://schemas.microsoft.com/office/drawing/2010/main" Requires="a14">
+      <mc:AlternateContent xmlns:mc="http://schemas.openxmlformats.org/markup-compatibility/2006" xmlns:a14="http://schemas.microsoft.com/office/drawing/2010/main">
+        <mc:Choice Requires="a14">
           <p:sp>
             <p:nvSpPr>
               <p:cNvPr id="85" name="TextBox 84">
@@ -10335,7 +10501,7 @@
             </p:txBody>
           </p:sp>
         </mc:Choice>
-        <mc:Fallback>
+        <mc:Fallback xmlns="">
           <p:sp>
             <p:nvSpPr>
               <p:cNvPr id="85" name="TextBox 84">
@@ -10380,8 +10546,8 @@
           </p:sp>
         </mc:Fallback>
       </mc:AlternateContent>
-      <mc:AlternateContent xmlns:mc="http://schemas.openxmlformats.org/markup-compatibility/2006">
-        <mc:Choice xmlns:a14="http://schemas.microsoft.com/office/drawing/2010/main" Requires="a14">
+      <mc:AlternateContent xmlns:mc="http://schemas.openxmlformats.org/markup-compatibility/2006" xmlns:a14="http://schemas.microsoft.com/office/drawing/2010/main">
+        <mc:Choice Requires="a14">
           <p:sp>
             <p:nvSpPr>
               <p:cNvPr id="86" name="TextBox 85">
@@ -11104,7 +11270,7 @@
             </p:txBody>
           </p:sp>
         </mc:Choice>
-        <mc:Fallback>
+        <mc:Fallback xmlns="">
           <p:sp>
             <p:nvSpPr>
               <p:cNvPr id="86" name="TextBox 85">
@@ -11149,8 +11315,8 @@
           </p:sp>
         </mc:Fallback>
       </mc:AlternateContent>
-      <mc:AlternateContent xmlns:mc="http://schemas.openxmlformats.org/markup-compatibility/2006">
-        <mc:Choice xmlns:a14="http://schemas.microsoft.com/office/drawing/2010/main" Requires="a14">
+      <mc:AlternateContent xmlns:mc="http://schemas.openxmlformats.org/markup-compatibility/2006" xmlns:a14="http://schemas.microsoft.com/office/drawing/2010/main">
+        <mc:Choice Requires="a14">
           <p:sp>
             <p:nvSpPr>
               <p:cNvPr id="88" name="TextBox 87">
@@ -12083,7 +12249,7 @@
             </p:txBody>
           </p:sp>
         </mc:Choice>
-        <mc:Fallback>
+        <mc:Fallback xmlns="">
           <p:sp>
             <p:nvSpPr>
               <p:cNvPr id="88" name="TextBox 87">
@@ -12128,8 +12294,8 @@
           </p:sp>
         </mc:Fallback>
       </mc:AlternateContent>
-      <mc:AlternateContent xmlns:mc="http://schemas.openxmlformats.org/markup-compatibility/2006">
-        <mc:Choice xmlns:a14="http://schemas.microsoft.com/office/drawing/2010/main" Requires="a14">
+      <mc:AlternateContent xmlns:mc="http://schemas.openxmlformats.org/markup-compatibility/2006" xmlns:a14="http://schemas.microsoft.com/office/drawing/2010/main">
+        <mc:Choice Requires="a14">
           <p:sp>
             <p:nvSpPr>
               <p:cNvPr id="89" name="TextBox 88">
@@ -12953,7 +13119,7 @@
             </p:txBody>
           </p:sp>
         </mc:Choice>
-        <mc:Fallback>
+        <mc:Fallback xmlns="">
           <p:sp>
             <p:nvSpPr>
               <p:cNvPr id="89" name="TextBox 88">
@@ -13050,7 +13216,7 @@
         </p:blipFill>
         <p:spPr>
           <a:xfrm>
-            <a:off x="20886778" y="9401015"/>
+            <a:off x="21071684" y="9447566"/>
             <a:ext cx="2946400" cy="4689273"/>
           </a:xfrm>
           <a:prstGeom prst="rect">
@@ -13121,7 +13287,7 @@
         </p:blipFill>
         <p:spPr bwMode="auto">
           <a:xfrm>
-            <a:off x="21294278" y="18843120"/>
+            <a:off x="21424378" y="18849936"/>
             <a:ext cx="5520322" cy="2799094"/>
           </a:xfrm>
           <a:prstGeom prst="rect">
@@ -13172,6 +13338,156 @@
           </a:ln>
         </p:spPr>
       </p:pic>
+      <p:sp>
+        <p:nvSpPr>
+          <p:cNvPr id="2" name="TextBox 1">
+            <a:extLst>
+              <a:ext uri="{FF2B5EF4-FFF2-40B4-BE49-F238E27FC236}">
+                <a16:creationId xmlns:a16="http://schemas.microsoft.com/office/drawing/2014/main" id="{35A54020-AA72-8D4A-9F61-7B903BF85526}"/>
+              </a:ext>
+            </a:extLst>
+          </p:cNvPr>
+          <p:cNvSpPr txBox="1"/>
+          <p:nvPr/>
+        </p:nvSpPr>
+        <p:spPr>
+          <a:xfrm>
+            <a:off x="26069375" y="8212305"/>
+            <a:ext cx="5250220" cy="369332"/>
+          </a:xfrm>
+          <a:prstGeom prst="rect">
+            <a:avLst/>
+          </a:prstGeom>
+          <a:noFill/>
+        </p:spPr>
+        <p:txBody>
+          <a:bodyPr wrap="none" rtlCol="0">
+            <a:spAutoFit/>
+          </a:bodyPr>
+          <a:lstStyle/>
+          <a:p>
+            <a:r>
+              <a:rPr lang="en-US" dirty="0"/>
+              <a:t>Fig.1 Tree for handling all edge cases for </a:t>
+            </a:r>
+            <a:r>
+              <a:rPr lang="en-US" dirty="0" err="1"/>
+              <a:t>Matmul</a:t>
+            </a:r>
+            <a:r>
+              <a:rPr lang="en-US" dirty="0"/>
+              <a:t> </a:t>
+            </a:r>
+          </a:p>
+        </p:txBody>
+      </p:sp>
+      <p:sp>
+        <p:nvSpPr>
+          <p:cNvPr id="4" name="TextBox 3">
+            <a:extLst>
+              <a:ext uri="{FF2B5EF4-FFF2-40B4-BE49-F238E27FC236}">
+                <a16:creationId xmlns:a16="http://schemas.microsoft.com/office/drawing/2014/main" id="{D5D669FB-43C2-2D42-9ACC-BCCE6458F2D6}"/>
+              </a:ext>
+            </a:extLst>
+          </p:cNvPr>
+          <p:cNvSpPr txBox="1"/>
+          <p:nvPr/>
+        </p:nvSpPr>
+        <p:spPr>
+          <a:xfrm>
+            <a:off x="6641543" y="20656666"/>
+            <a:ext cx="4559335" cy="1107996"/>
+          </a:xfrm>
+          <a:prstGeom prst="rect">
+            <a:avLst/>
+          </a:prstGeom>
+          <a:noFill/>
+        </p:spPr>
+        <p:txBody>
+          <a:bodyPr wrap="square" rtlCol="0">
+            <a:spAutoFit/>
+          </a:bodyPr>
+          <a:lstStyle/>
+          <a:p>
+            <a:r>
+              <a:rPr lang="en-US" sz="1600" spc="-1" dirty="0">
+                <a:solidFill>
+                  <a:srgbClr val="000000"/>
+                </a:solidFill>
+                <a:latin typeface="Arial" panose="020B0604020202020204" pitchFamily="34" charset="0"/>
+                <a:cs typeface="Arial" panose="020B0604020202020204" pitchFamily="34" charset="0"/>
+              </a:rPr>
+              <a:t>List.1 Tiled version of tensor contraction (single level cache), Ni, Nj,… , </a:t>
+            </a:r>
+            <a:r>
+              <a:rPr lang="en-US" sz="1600" spc="-1" dirty="0" err="1">
+                <a:solidFill>
+                  <a:srgbClr val="000000"/>
+                </a:solidFill>
+                <a:latin typeface="Arial" panose="020B0604020202020204" pitchFamily="34" charset="0"/>
+                <a:cs typeface="Arial" panose="020B0604020202020204" pitchFamily="34" charset="0"/>
+              </a:rPr>
+              <a:t>Nn</a:t>
+            </a:r>
+            <a:r>
+              <a:rPr lang="en-US" sz="1600" spc="-1" dirty="0">
+                <a:solidFill>
+                  <a:srgbClr val="000000"/>
+                </a:solidFill>
+                <a:latin typeface="Arial" panose="020B0604020202020204" pitchFamily="34" charset="0"/>
+                <a:cs typeface="Arial" panose="020B0604020202020204" pitchFamily="34" charset="0"/>
+              </a:rPr>
+              <a:t> are problem ranges, </a:t>
+            </a:r>
+            <a:r>
+              <a:rPr lang="en-US" sz="1600" spc="-1" dirty="0" err="1">
+                <a:solidFill>
+                  <a:srgbClr val="000000"/>
+                </a:solidFill>
+                <a:latin typeface="Arial" panose="020B0604020202020204" pitchFamily="34" charset="0"/>
+                <a:cs typeface="Arial" panose="020B0604020202020204" pitchFamily="34" charset="0"/>
+              </a:rPr>
+              <a:t>Ti</a:t>
+            </a:r>
+            <a:r>
+              <a:rPr lang="en-US" sz="1600" spc="-1" dirty="0">
+                <a:solidFill>
+                  <a:srgbClr val="000000"/>
+                </a:solidFill>
+                <a:latin typeface="Arial" panose="020B0604020202020204" pitchFamily="34" charset="0"/>
+                <a:cs typeface="Arial" panose="020B0604020202020204" pitchFamily="34" charset="0"/>
+              </a:rPr>
+              <a:t>, </a:t>
+            </a:r>
+            <a:r>
+              <a:rPr lang="en-US" sz="1600" spc="-1" dirty="0" err="1">
+                <a:solidFill>
+                  <a:srgbClr val="000000"/>
+                </a:solidFill>
+                <a:latin typeface="Arial" panose="020B0604020202020204" pitchFamily="34" charset="0"/>
+                <a:cs typeface="Arial" panose="020B0604020202020204" pitchFamily="34" charset="0"/>
+              </a:rPr>
+              <a:t>Tj</a:t>
+            </a:r>
+            <a:r>
+              <a:rPr lang="en-US" sz="1600" spc="-1" dirty="0">
+                <a:solidFill>
+                  <a:srgbClr val="000000"/>
+                </a:solidFill>
+                <a:latin typeface="Arial" panose="020B0604020202020204" pitchFamily="34" charset="0"/>
+                <a:cs typeface="Arial" panose="020B0604020202020204" pitchFamily="34" charset="0"/>
+              </a:rPr>
+              <a:t>,…, Tn are tiles sizes. </a:t>
+            </a:r>
+          </a:p>
+          <a:p>
+            <a:endParaRPr lang="en-US" dirty="0">
+              <a:latin typeface="Arial" panose="020B0604020202020204" pitchFamily="34" charset="0"/>
+              <a:cs typeface="Arial" panose="020B0604020202020204" pitchFamily="34" charset="0"/>
+            </a:endParaRPr>
+          </a:p>
+        </p:txBody>
+      </p:sp>
     </p:spTree>
     <p:extLst>
       <p:ext uri="{BB962C8B-B14F-4D97-AF65-F5344CB8AC3E}">

</xml_diff>

<commit_message>
change experimental eval, update fig1
</commit_message>
<xml_diff>
--- a/sc19poster.pptx
+++ b/sc19poster.pptx
@@ -3091,8 +3091,6 @@
                 <a:srgbClr val="000000"/>
               </a:buClr>
               <a:buSzPct val="45000"/>
-              <a:buFont typeface="Wingdings" charset="2"/>
-              <a:buChar char=""/>
             </a:pPr>
             <a:r>
               <a:rPr lang="en-US" sz="3200" b="1" spc="-1" dirty="0">
@@ -5616,22 +5614,13 @@
                   <a:buChar char=""/>
                 </a:pPr>
                 <a:r>
-                  <a:rPr lang="en-US" sz="3200" spc="-1">
-                    <a:solidFill>
-                      <a:srgbClr val="000000"/>
-                    </a:solidFill>
-                    <a:latin typeface="Georgia" panose="02040502050405020303" pitchFamily="18" charset="0"/>
-                  </a:rPr>
-                  <a:t>Merge </a:t>
-                </a:r>
-                <a:r>
                   <a:rPr lang="en-US" sz="3200" spc="-1" dirty="0">
                     <a:solidFill>
                       <a:srgbClr val="000000"/>
                     </a:solidFill>
                     <a:latin typeface="Georgia" panose="02040502050405020303" pitchFamily="18" charset="0"/>
                   </a:rPr>
-                  <a:t>leaves of all trees with same cost expression</a:t>
+                  <a:t>Merge leaves of all trees with same cost expression</a:t>
                 </a:r>
               </a:p>
               <a:p>
@@ -6260,7 +6249,7 @@
         </p:nvSpPr>
         <p:spPr>
           <a:xfrm>
-            <a:off x="21507224" y="15807460"/>
+            <a:off x="21526383" y="15265595"/>
             <a:ext cx="10947234" cy="6772305"/>
           </a:xfrm>
           <a:prstGeom prst="rect">
@@ -6296,7 +6285,17 @@
                 <a:latin typeface="Georgia"/>
                 <a:ea typeface="Droid Sans Fallback"/>
               </a:rPr>
-              <a:t>Evaluation on TTCG benchmark on i7-6700K, single thread, comparing to TBLIS, TCL-BLIS and TCL-MKL</a:t>
+              <a:t>Geometric</a:t>
+            </a:r>
+            <a:r>
+              <a:rPr lang="en-US" sz="3200" spc="-1" dirty="0">
+                <a:solidFill>
+                  <a:srgbClr val="000000"/>
+                </a:solidFill>
+                <a:latin typeface="Georgia"/>
+                <a:ea typeface="Droid Sans Fallback"/>
+              </a:rPr>
+              <a:t> Mean speedup is 1.34x versus TBLIS, 1.27x versus TCL-MKL, and 1.34x versus TCL-BLIS on i7-6700K</a:t>
             </a:r>
             <a:endParaRPr lang="en-US" sz="3200" b="0" strike="noStrike" spc="-1" dirty="0">
               <a:solidFill>
@@ -6325,36 +6324,7 @@
                 <a:latin typeface="Georgia"/>
                 <a:ea typeface="Droid Sans Fallback"/>
               </a:rPr>
-              <a:t>Competitive when all tensors are huge</a:t>
-            </a:r>
-            <a:endParaRPr lang="en-US" sz="3200" b="0" strike="noStrike" spc="-1" dirty="0">
-              <a:solidFill>
-                <a:srgbClr val="000000"/>
-              </a:solidFill>
-              <a:latin typeface="LM Roman 7"/>
-            </a:endParaRPr>
-          </a:p>
-          <a:p>
-            <a:pPr marL="182880">
-              <a:lnSpc>
-                <a:spcPct val="120000"/>
-              </a:lnSpc>
-              <a:buClr>
-                <a:srgbClr val="000000"/>
-              </a:buClr>
-              <a:buSzPct val="45000"/>
-              <a:buFont typeface="Wingdings" charset="2"/>
-              <a:buChar char=""/>
-            </a:pPr>
-            <a:r>
-              <a:rPr lang="en-US" sz="3200" b="0" strike="noStrike" spc="-1" dirty="0">
-                <a:solidFill>
-                  <a:srgbClr val="000000"/>
-                </a:solidFill>
-                <a:latin typeface="Georgia"/>
-                <a:ea typeface="Droid Sans Fallback"/>
-              </a:rPr>
-              <a:t>Outperform when some inputs tensor are large or output tensor is large</a:t>
+              <a:t>Performance model can also be used for predicting execution time (less than 10% for most cases)</a:t>
             </a:r>
             <a:endParaRPr lang="en-US" sz="3200" b="0" strike="noStrike" spc="-1" dirty="0">
               <a:solidFill>
@@ -7477,25 +7447,7 @@
                 </a:solidFill>
                 <a:latin typeface="Georgia" panose="02040502050405020303" pitchFamily="18" charset="0"/>
               </a:rPr>
-              <a:t>Footprints in </a:t>
-            </a:r>
-            <a:r>
-              <a:rPr lang="en-US" sz="3200" spc="-1" dirty="0">
-                <a:solidFill>
-                  <a:srgbClr val="3D92F0"/>
-                </a:solidFill>
-                <a:latin typeface="Georgia" panose="02040502050405020303" pitchFamily="18" charset="0"/>
-              </a:rPr>
-              <a:t>point loops </a:t>
-            </a:r>
-            <a:r>
-              <a:rPr lang="en-US" sz="3200" spc="-1" dirty="0">
-                <a:solidFill>
-                  <a:srgbClr val="000000"/>
-                </a:solidFill>
-                <a:latin typeface="Georgia" panose="02040502050405020303" pitchFamily="18" charset="0"/>
-              </a:rPr>
-              <a:t>fit in cache</a:t>
+              <a:t> Tile sizes are selected such that the data foot print fits in cache</a:t>
             </a:r>
           </a:p>
           <a:p>
@@ -13175,36 +13127,6 @@
       </mc:AlternateContent>
       <p:pic>
         <p:nvPicPr>
-          <p:cNvPr id="90" name="Picture 89">
-            <a:extLst>
-              <a:ext uri="{FF2B5EF4-FFF2-40B4-BE49-F238E27FC236}">
-                <a16:creationId xmlns:a16="http://schemas.microsoft.com/office/drawing/2014/main" id="{0BA30A0A-1592-984C-9B14-1A75E29A319E}"/>
-              </a:ext>
-            </a:extLst>
-          </p:cNvPr>
-          <p:cNvPicPr>
-            <a:picLocks noChangeAspect="1"/>
-          </p:cNvPicPr>
-          <p:nvPr/>
-        </p:nvPicPr>
-        <p:blipFill>
-          <a:blip r:embed="rId14"/>
-          <a:stretch>
-            <a:fillRect/>
-          </a:stretch>
-        </p:blipFill>
-        <p:spPr>
-          <a:xfrm>
-            <a:off x="21487424" y="4903477"/>
-            <a:ext cx="10534502" cy="3651563"/>
-          </a:xfrm>
-          <a:prstGeom prst="rect">
-            <a:avLst/>
-          </a:prstGeom>
-        </p:spPr>
-      </p:pic>
-      <p:pic>
-        <p:nvPicPr>
           <p:cNvPr id="91" name="Picture 90">
             <a:extLst>
               <a:ext uri="{FF2B5EF4-FFF2-40B4-BE49-F238E27FC236}">
@@ -13218,7 +13140,7 @@
           <p:nvPr/>
         </p:nvPicPr>
         <p:blipFill>
-          <a:blip r:embed="rId15"/>
+          <a:blip r:embed="rId14"/>
           <a:stretch>
             <a:fillRect/>
           </a:stretch>
@@ -13248,7 +13170,7 @@
           <p:nvPr/>
         </p:nvPicPr>
         <p:blipFill>
-          <a:blip r:embed="rId16">
+          <a:blip r:embed="rId15">
             <a:extLst>
               <a:ext uri="{28A0092B-C50C-407E-A947-70E740481C1C}">
                 <a14:useLocalDpi xmlns:a14="http://schemas.microsoft.com/office/drawing/2010/main" val="0"/>
@@ -13267,84 +13189,6 @@
           <a:prstGeom prst="rect">
             <a:avLst/>
           </a:prstGeom>
-        </p:spPr>
-      </p:pic>
-      <p:pic>
-        <p:nvPicPr>
-          <p:cNvPr id="93" name="Picture 92" descr="/var/folders/0y/nh3c18v54kv1m7tyhyxgxh4r0000gn/T/com.microsoft.Word/Content.MSO/9D5DEB0C.tmp">
-            <a:extLst>
-              <a:ext uri="{FF2B5EF4-FFF2-40B4-BE49-F238E27FC236}">
-                <a16:creationId xmlns:a16="http://schemas.microsoft.com/office/drawing/2014/main" id="{A2793C91-591F-284B-804C-4BF6C10DE41F}"/>
-              </a:ext>
-            </a:extLst>
-          </p:cNvPr>
-          <p:cNvPicPr/>
-          <p:nvPr/>
-        </p:nvPicPr>
-        <p:blipFill>
-          <a:blip r:embed="rId17">
-            <a:extLst>
-              <a:ext uri="{28A0092B-C50C-407E-A947-70E740481C1C}">
-                <a14:useLocalDpi xmlns:a14="http://schemas.microsoft.com/office/drawing/2010/main" val="0"/>
-              </a:ext>
-            </a:extLst>
-          </a:blip>
-          <a:srcRect/>
-          <a:stretch>
-            <a:fillRect/>
-          </a:stretch>
-        </p:blipFill>
-        <p:spPr bwMode="auto">
-          <a:xfrm>
-            <a:off x="21424378" y="18849936"/>
-            <a:ext cx="5520322" cy="2799094"/>
-          </a:xfrm>
-          <a:prstGeom prst="rect">
-            <a:avLst/>
-          </a:prstGeom>
-          <a:noFill/>
-          <a:ln>
-            <a:noFill/>
-          </a:ln>
-        </p:spPr>
-      </p:pic>
-      <p:pic>
-        <p:nvPicPr>
-          <p:cNvPr id="94" name="Picture 93" descr="/var/folders/0y/nh3c18v54kv1m7tyhyxgxh4r0000gn/T/com.microsoft.Word/Content.MSO/5DC75709.tmp">
-            <a:extLst>
-              <a:ext uri="{FF2B5EF4-FFF2-40B4-BE49-F238E27FC236}">
-                <a16:creationId xmlns:a16="http://schemas.microsoft.com/office/drawing/2014/main" id="{B33A237C-A23B-A243-BA9A-52DBA35E7038}"/>
-              </a:ext>
-            </a:extLst>
-          </p:cNvPr>
-          <p:cNvPicPr/>
-          <p:nvPr/>
-        </p:nvPicPr>
-        <p:blipFill>
-          <a:blip r:embed="rId18">
-            <a:extLst>
-              <a:ext uri="{28A0092B-C50C-407E-A947-70E740481C1C}">
-                <a14:useLocalDpi xmlns:a14="http://schemas.microsoft.com/office/drawing/2010/main" val="0"/>
-              </a:ext>
-            </a:extLst>
-          </a:blip>
-          <a:srcRect/>
-          <a:stretch>
-            <a:fillRect/>
-          </a:stretch>
-        </p:blipFill>
-        <p:spPr bwMode="auto">
-          <a:xfrm>
-            <a:off x="26720204" y="18885303"/>
-            <a:ext cx="5690963" cy="2701000"/>
-          </a:xfrm>
-          <a:prstGeom prst="rect">
-            <a:avLst/>
-          </a:prstGeom>
-          <a:noFill/>
-          <a:ln>
-            <a:noFill/>
-          </a:ln>
         </p:spPr>
       </p:pic>
       <p:sp>
@@ -13497,6 +13341,138 @@
           </a:p>
         </p:txBody>
       </p:sp>
+      <p:pic>
+        <p:nvPicPr>
+          <p:cNvPr id="1030" name="Picture 6">
+            <a:extLst>
+              <a:ext uri="{FF2B5EF4-FFF2-40B4-BE49-F238E27FC236}">
+                <a16:creationId xmlns:a16="http://schemas.microsoft.com/office/drawing/2014/main" id="{DA24C463-335C-B743-9CE5-E3BF21E84A3E}"/>
+              </a:ext>
+            </a:extLst>
+          </p:cNvPr>
+          <p:cNvPicPr>
+            <a:picLocks noChangeAspect="1" noChangeArrowheads="1"/>
+          </p:cNvPicPr>
+          <p:nvPr/>
+        </p:nvPicPr>
+        <p:blipFill>
+          <a:blip r:embed="rId16">
+            <a:extLst>
+              <a:ext uri="{28A0092B-C50C-407E-A947-70E740481C1C}">
+                <a14:useLocalDpi xmlns:a14="http://schemas.microsoft.com/office/drawing/2010/main" val="0"/>
+              </a:ext>
+            </a:extLst>
+          </a:blip>
+          <a:srcRect/>
+          <a:stretch>
+            <a:fillRect/>
+          </a:stretch>
+        </p:blipFill>
+        <p:spPr bwMode="auto">
+          <a:xfrm>
+            <a:off x="21399840" y="17976344"/>
+            <a:ext cx="10756091" cy="2852110"/>
+          </a:xfrm>
+          <a:prstGeom prst="rect">
+            <a:avLst/>
+          </a:prstGeom>
+          <a:noFill/>
+          <a:extLst>
+            <a:ext uri="{909E8E84-426E-40DD-AFC4-6F175D3DCCD1}">
+              <a14:hiddenFill xmlns:a14="http://schemas.microsoft.com/office/drawing/2010/main">
+                <a:solidFill>
+                  <a:srgbClr val="FFFFFF"/>
+                </a:solidFill>
+              </a14:hiddenFill>
+            </a:ext>
+          </a:extLst>
+        </p:spPr>
+      </p:pic>
+      <p:sp>
+        <p:nvSpPr>
+          <p:cNvPr id="8" name="TextBox 7">
+            <a:extLst>
+              <a:ext uri="{FF2B5EF4-FFF2-40B4-BE49-F238E27FC236}">
+                <a16:creationId xmlns:a16="http://schemas.microsoft.com/office/drawing/2014/main" id="{131A8981-6427-C547-A5DA-012ECF746509}"/>
+              </a:ext>
+            </a:extLst>
+          </p:cNvPr>
+          <p:cNvSpPr txBox="1"/>
+          <p:nvPr/>
+        </p:nvSpPr>
+        <p:spPr>
+          <a:xfrm>
+            <a:off x="22167000" y="20938648"/>
+            <a:ext cx="9854926" cy="923330"/>
+          </a:xfrm>
+          <a:prstGeom prst="rect">
+            <a:avLst/>
+          </a:prstGeom>
+          <a:noFill/>
+        </p:spPr>
+        <p:txBody>
+          <a:bodyPr wrap="square" rtlCol="0">
+            <a:spAutoFit/>
+          </a:bodyPr>
+          <a:lstStyle/>
+          <a:p>
+            <a:r>
+              <a:rPr lang="en-US" spc="-1" dirty="0">
+                <a:solidFill>
+                  <a:srgbClr val="000000"/>
+                </a:solidFill>
+                <a:latin typeface="Arial" panose="020B0604020202020204" pitchFamily="34" charset="0"/>
+                <a:ea typeface="Droid Sans Fallback"/>
+                <a:cs typeface="Arial" panose="020B0604020202020204" pitchFamily="34" charset="0"/>
+              </a:rPr>
+              <a:t>Fig.2 Evaluation on TTCG benchmark on i7-6700K, single thread, comparing to TBLIS, TCL-BLIS and TCL-MKL</a:t>
+            </a:r>
+            <a:endParaRPr lang="en-US" spc="-1" dirty="0">
+              <a:solidFill>
+                <a:srgbClr val="000000"/>
+              </a:solidFill>
+              <a:latin typeface="Arial" panose="020B0604020202020204" pitchFamily="34" charset="0"/>
+              <a:cs typeface="Arial" panose="020B0604020202020204" pitchFamily="34" charset="0"/>
+            </a:endParaRPr>
+          </a:p>
+          <a:p>
+            <a:endParaRPr lang="en-US" dirty="0">
+              <a:latin typeface="Arial" panose="020B0604020202020204" pitchFamily="34" charset="0"/>
+              <a:cs typeface="Arial" panose="020B0604020202020204" pitchFamily="34" charset="0"/>
+            </a:endParaRPr>
+          </a:p>
+        </p:txBody>
+      </p:sp>
+      <p:pic>
+        <p:nvPicPr>
+          <p:cNvPr id="9" name="Picture 8">
+            <a:extLst>
+              <a:ext uri="{FF2B5EF4-FFF2-40B4-BE49-F238E27FC236}">
+                <a16:creationId xmlns:a16="http://schemas.microsoft.com/office/drawing/2014/main" id="{41B5B540-03C9-B94B-B521-A765B4B52059}"/>
+              </a:ext>
+            </a:extLst>
+          </p:cNvPr>
+          <p:cNvPicPr>
+            <a:picLocks noChangeAspect="1"/>
+          </p:cNvPicPr>
+          <p:nvPr/>
+        </p:nvPicPr>
+        <p:blipFill>
+          <a:blip r:embed="rId17"/>
+          <a:stretch>
+            <a:fillRect/>
+          </a:stretch>
+        </p:blipFill>
+        <p:spPr>
+          <a:xfrm>
+            <a:off x="21278354" y="4638709"/>
+            <a:ext cx="10490200" cy="3886200"/>
+          </a:xfrm>
+          <a:prstGeom prst="rect">
+            <a:avLst/>
+          </a:prstGeom>
+        </p:spPr>
+      </p:pic>
     </p:spTree>
     <p:extLst>
       <p:ext uri="{BB962C8B-B14F-4D97-AF65-F5344CB8AC3E}">

</xml_diff>